<commit_message>
plotting block averages the right way
</commit_message>
<xml_diff>
--- a/SRM-NIRS-EEG Update 6-7-2024.pptx
+++ b/SRM-NIRS-EEG Update 6-7-2024.pptx
@@ -8,12 +8,16 @@
     <p:sldId id="256" r:id="rId2"/>
     <p:sldId id="257" r:id="rId3"/>
     <p:sldId id="258" r:id="rId4"/>
-    <p:sldId id="263" r:id="rId5"/>
-    <p:sldId id="264" r:id="rId6"/>
-    <p:sldId id="259" r:id="rId7"/>
-    <p:sldId id="262" r:id="rId8"/>
-    <p:sldId id="261" r:id="rId9"/>
-    <p:sldId id="260" r:id="rId10"/>
+    <p:sldId id="266" r:id="rId5"/>
+    <p:sldId id="267" r:id="rId6"/>
+    <p:sldId id="268" r:id="rId7"/>
+    <p:sldId id="264" r:id="rId8"/>
+    <p:sldId id="263" r:id="rId9"/>
+    <p:sldId id="259" r:id="rId10"/>
+    <p:sldId id="262" r:id="rId11"/>
+    <p:sldId id="261" r:id="rId12"/>
+    <p:sldId id="260" r:id="rId13"/>
+    <p:sldId id="265" r:id="rId14"/>
   </p:sldIdLst>
   <p:sldSz cx="12192000" cy="6858000"/>
   <p:notesSz cx="6858000" cy="9144000"/>
@@ -112,6 +116,11 @@
       </a:defRPr>
     </a:lvl9pPr>
   </p:defaultTextStyle>
+  <p:extLst>
+    <p:ext uri="{EFAFB233-063F-42B5-8137-9DF3F51BA10A}">
+      <p15:sldGuideLst xmlns:p15="http://schemas.microsoft.com/office/powerpoint/2012/main"/>
+    </p:ext>
+  </p:extLst>
 </p:presentation>
 </file>
 
@@ -262,7 +271,7 @@
           <a:p>
             <a:fld id="{844B939F-3FB1-4DA9-BBAD-2CC7FE554B1A}" type="datetimeFigureOut">
               <a:rPr lang="en-US" smtClean="0"/>
-              <a:t>6/4/2024</a:t>
+              <a:t>6/5/2024</a:t>
             </a:fld>
             <a:endParaRPr lang="en-US"/>
           </a:p>
@@ -460,7 +469,7 @@
           <a:p>
             <a:fld id="{844B939F-3FB1-4DA9-BBAD-2CC7FE554B1A}" type="datetimeFigureOut">
               <a:rPr lang="en-US" smtClean="0"/>
-              <a:t>6/4/2024</a:t>
+              <a:t>6/5/2024</a:t>
             </a:fld>
             <a:endParaRPr lang="en-US"/>
           </a:p>
@@ -668,7 +677,7 @@
           <a:p>
             <a:fld id="{844B939F-3FB1-4DA9-BBAD-2CC7FE554B1A}" type="datetimeFigureOut">
               <a:rPr lang="en-US" smtClean="0"/>
-              <a:t>6/4/2024</a:t>
+              <a:t>6/5/2024</a:t>
             </a:fld>
             <a:endParaRPr lang="en-US"/>
           </a:p>
@@ -866,7 +875,7 @@
           <a:p>
             <a:fld id="{844B939F-3FB1-4DA9-BBAD-2CC7FE554B1A}" type="datetimeFigureOut">
               <a:rPr lang="en-US" smtClean="0"/>
-              <a:t>6/4/2024</a:t>
+              <a:t>6/5/2024</a:t>
             </a:fld>
             <a:endParaRPr lang="en-US"/>
           </a:p>
@@ -1141,7 +1150,7 @@
           <a:p>
             <a:fld id="{844B939F-3FB1-4DA9-BBAD-2CC7FE554B1A}" type="datetimeFigureOut">
               <a:rPr lang="en-US" smtClean="0"/>
-              <a:t>6/4/2024</a:t>
+              <a:t>6/5/2024</a:t>
             </a:fld>
             <a:endParaRPr lang="en-US"/>
           </a:p>
@@ -1406,7 +1415,7 @@
           <a:p>
             <a:fld id="{844B939F-3FB1-4DA9-BBAD-2CC7FE554B1A}" type="datetimeFigureOut">
               <a:rPr lang="en-US" smtClean="0"/>
-              <a:t>6/4/2024</a:t>
+              <a:t>6/5/2024</a:t>
             </a:fld>
             <a:endParaRPr lang="en-US"/>
           </a:p>
@@ -1818,7 +1827,7 @@
           <a:p>
             <a:fld id="{844B939F-3FB1-4DA9-BBAD-2CC7FE554B1A}" type="datetimeFigureOut">
               <a:rPr lang="en-US" smtClean="0"/>
-              <a:t>6/4/2024</a:t>
+              <a:t>6/5/2024</a:t>
             </a:fld>
             <a:endParaRPr lang="en-US"/>
           </a:p>
@@ -1959,7 +1968,7 @@
           <a:p>
             <a:fld id="{844B939F-3FB1-4DA9-BBAD-2CC7FE554B1A}" type="datetimeFigureOut">
               <a:rPr lang="en-US" smtClean="0"/>
-              <a:t>6/4/2024</a:t>
+              <a:t>6/5/2024</a:t>
             </a:fld>
             <a:endParaRPr lang="en-US"/>
           </a:p>
@@ -2072,7 +2081,7 @@
           <a:p>
             <a:fld id="{844B939F-3FB1-4DA9-BBAD-2CC7FE554B1A}" type="datetimeFigureOut">
               <a:rPr lang="en-US" smtClean="0"/>
-              <a:t>6/4/2024</a:t>
+              <a:t>6/5/2024</a:t>
             </a:fld>
             <a:endParaRPr lang="en-US"/>
           </a:p>
@@ -2383,7 +2392,7 @@
           <a:p>
             <a:fld id="{844B939F-3FB1-4DA9-BBAD-2CC7FE554B1A}" type="datetimeFigureOut">
               <a:rPr lang="en-US" smtClean="0"/>
-              <a:t>6/4/2024</a:t>
+              <a:t>6/5/2024</a:t>
             </a:fld>
             <a:endParaRPr lang="en-US"/>
           </a:p>
@@ -2671,7 +2680,7 @@
           <a:p>
             <a:fld id="{844B939F-3FB1-4DA9-BBAD-2CC7FE554B1A}" type="datetimeFigureOut">
               <a:rPr lang="en-US" smtClean="0"/>
-              <a:t>6/4/2024</a:t>
+              <a:t>6/5/2024</a:t>
             </a:fld>
             <a:endParaRPr lang="en-US"/>
           </a:p>
@@ -2912,7 +2921,7 @@
           <a:p>
             <a:fld id="{844B939F-3FB1-4DA9-BBAD-2CC7FE554B1A}" type="datetimeFigureOut">
               <a:rPr lang="en-US" smtClean="0"/>
-              <a:t>6/4/2024</a:t>
+              <a:t>6/5/2024</a:t>
             </a:fld>
             <a:endParaRPr lang="en-US"/>
           </a:p>
@@ -3398,6 +3407,614 @@
 </p:sld>
 </file>
 
+<file path=ppt/slides/slide10.xml><?xml version="1.0" encoding="utf-8"?>
+<p:sld xmlns:a="http://schemas.openxmlformats.org/drawingml/2006/main" xmlns:r="http://schemas.openxmlformats.org/officeDocument/2006/relationships" xmlns:p="http://schemas.openxmlformats.org/presentationml/2006/main">
+  <p:cSld>
+    <p:spTree>
+      <p:nvGrpSpPr>
+        <p:cNvPr id="1" name=""/>
+        <p:cNvGrpSpPr/>
+        <p:nvPr/>
+      </p:nvGrpSpPr>
+      <p:grpSpPr>
+        <a:xfrm>
+          <a:off x="0" y="0"/>
+          <a:ext cx="0" cy="0"/>
+          <a:chOff x="0" y="0"/>
+          <a:chExt cx="0" cy="0"/>
+        </a:xfrm>
+      </p:grpSpPr>
+      <p:sp>
+        <p:nvSpPr>
+          <p:cNvPr id="2" name="Title 1">
+            <a:extLst>
+              <a:ext uri="{FF2B5EF4-FFF2-40B4-BE49-F238E27FC236}">
+                <a16:creationId xmlns:a16="http://schemas.microsoft.com/office/drawing/2014/main" id="{EBE6161A-9094-26BB-F266-A48556AE5609}"/>
+              </a:ext>
+            </a:extLst>
+          </p:cNvPr>
+          <p:cNvSpPr>
+            <a:spLocks noGrp="1"/>
+          </p:cNvSpPr>
+          <p:nvPr>
+            <p:ph type="title"/>
+          </p:nvPr>
+        </p:nvSpPr>
+        <p:spPr>
+          <a:xfrm>
+            <a:off x="838200" y="365125"/>
+            <a:ext cx="10515600" cy="823595"/>
+          </a:xfrm>
+        </p:spPr>
+        <p:txBody>
+          <a:bodyPr/>
+          <a:lstStyle/>
+          <a:p>
+            <a:r>
+              <a:rPr lang="en-US" dirty="0"/>
+              <a:t>GLM </a:t>
+            </a:r>
+            <a:r>
+              <a:rPr lang="en-US" dirty="0" err="1"/>
+              <a:t>topoplots</a:t>
+            </a:r>
+            <a:r>
+              <a:rPr lang="en-US" dirty="0"/>
+              <a:t> (BH Corrected a la Eli)</a:t>
+            </a:r>
+          </a:p>
+        </p:txBody>
+      </p:sp>
+      <p:sp>
+        <p:nvSpPr>
+          <p:cNvPr id="4" name="TextBox 3">
+            <a:extLst>
+              <a:ext uri="{FF2B5EF4-FFF2-40B4-BE49-F238E27FC236}">
+                <a16:creationId xmlns:a16="http://schemas.microsoft.com/office/drawing/2014/main" id="{EF2246E9-812C-67E4-EDE1-3294B11ADFED}"/>
+              </a:ext>
+            </a:extLst>
+          </p:cNvPr>
+          <p:cNvSpPr txBox="1"/>
+          <p:nvPr/>
+        </p:nvSpPr>
+        <p:spPr>
+          <a:xfrm>
+            <a:off x="364028" y="1004054"/>
+            <a:ext cx="1837421" cy="369332"/>
+          </a:xfrm>
+          <a:prstGeom prst="rect">
+            <a:avLst/>
+          </a:prstGeom>
+          <a:noFill/>
+        </p:spPr>
+        <p:txBody>
+          <a:bodyPr wrap="square" rtlCol="0">
+            <a:spAutoFit/>
+          </a:bodyPr>
+          <a:lstStyle/>
+          <a:p>
+            <a:r>
+              <a:rPr lang="en-US" dirty="0"/>
+              <a:t>Speech masker</a:t>
+            </a:r>
+          </a:p>
+        </p:txBody>
+      </p:sp>
+      <p:pic>
+        <p:nvPicPr>
+          <p:cNvPr id="16" name="Picture 15">
+            <a:extLst>
+              <a:ext uri="{FF2B5EF4-FFF2-40B4-BE49-F238E27FC236}">
+                <a16:creationId xmlns:a16="http://schemas.microsoft.com/office/drawing/2014/main" id="{F332F77E-7440-B40C-A2C3-F155A6D74460}"/>
+              </a:ext>
+            </a:extLst>
+          </p:cNvPr>
+          <p:cNvPicPr>
+            <a:picLocks noChangeAspect="1"/>
+          </p:cNvPicPr>
+          <p:nvPr/>
+        </p:nvPicPr>
+        <p:blipFill>
+          <a:blip r:embed="rId2"/>
+          <a:stretch>
+            <a:fillRect/>
+          </a:stretch>
+        </p:blipFill>
+        <p:spPr>
+          <a:xfrm>
+            <a:off x="158317" y="4368800"/>
+            <a:ext cx="3032246" cy="2367280"/>
+          </a:xfrm>
+          <a:prstGeom prst="rect">
+            <a:avLst/>
+          </a:prstGeom>
+        </p:spPr>
+      </p:pic>
+      <p:pic>
+        <p:nvPicPr>
+          <p:cNvPr id="18" name="Picture 17">
+            <a:extLst>
+              <a:ext uri="{FF2B5EF4-FFF2-40B4-BE49-F238E27FC236}">
+                <a16:creationId xmlns:a16="http://schemas.microsoft.com/office/drawing/2014/main" id="{D2C54787-D6C5-01A0-802E-040B7167778D}"/>
+              </a:ext>
+            </a:extLst>
+          </p:cNvPr>
+          <p:cNvPicPr>
+            <a:picLocks noChangeAspect="1"/>
+          </p:cNvPicPr>
+          <p:nvPr/>
+        </p:nvPicPr>
+        <p:blipFill>
+          <a:blip r:embed="rId3"/>
+          <a:stretch>
+            <a:fillRect/>
+          </a:stretch>
+        </p:blipFill>
+        <p:spPr>
+          <a:xfrm>
+            <a:off x="3388457" y="4409764"/>
+            <a:ext cx="2961544" cy="2285352"/>
+          </a:xfrm>
+          <a:prstGeom prst="rect">
+            <a:avLst/>
+          </a:prstGeom>
+        </p:spPr>
+      </p:pic>
+      <p:pic>
+        <p:nvPicPr>
+          <p:cNvPr id="20" name="Picture 19">
+            <a:extLst>
+              <a:ext uri="{FF2B5EF4-FFF2-40B4-BE49-F238E27FC236}">
+                <a16:creationId xmlns:a16="http://schemas.microsoft.com/office/drawing/2014/main" id="{CFE8CD7E-392F-2BDF-7275-7BC451C2271A}"/>
+              </a:ext>
+            </a:extLst>
+          </p:cNvPr>
+          <p:cNvPicPr>
+            <a:picLocks noChangeAspect="1"/>
+          </p:cNvPicPr>
+          <p:nvPr/>
+        </p:nvPicPr>
+        <p:blipFill>
+          <a:blip r:embed="rId4"/>
+          <a:stretch>
+            <a:fillRect/>
+          </a:stretch>
+        </p:blipFill>
+        <p:spPr>
+          <a:xfrm>
+            <a:off x="6363083" y="4384674"/>
+            <a:ext cx="2969940" cy="2298476"/>
+          </a:xfrm>
+          <a:prstGeom prst="rect">
+            <a:avLst/>
+          </a:prstGeom>
+        </p:spPr>
+      </p:pic>
+      <p:pic>
+        <p:nvPicPr>
+          <p:cNvPr id="22" name="Picture 21">
+            <a:extLst>
+              <a:ext uri="{FF2B5EF4-FFF2-40B4-BE49-F238E27FC236}">
+                <a16:creationId xmlns:a16="http://schemas.microsoft.com/office/drawing/2014/main" id="{26EB9422-572A-FC38-E0E3-3B80055E81B9}"/>
+              </a:ext>
+            </a:extLst>
+          </p:cNvPr>
+          <p:cNvPicPr>
+            <a:picLocks noChangeAspect="1"/>
+          </p:cNvPicPr>
+          <p:nvPr/>
+        </p:nvPicPr>
+        <p:blipFill>
+          <a:blip r:embed="rId5"/>
+          <a:stretch>
+            <a:fillRect/>
+          </a:stretch>
+        </p:blipFill>
+        <p:spPr>
+          <a:xfrm>
+            <a:off x="9346106" y="4489994"/>
+            <a:ext cx="2713814" cy="2124892"/>
+          </a:xfrm>
+          <a:prstGeom prst="rect">
+            <a:avLst/>
+          </a:prstGeom>
+        </p:spPr>
+      </p:pic>
+      <p:sp>
+        <p:nvSpPr>
+          <p:cNvPr id="23" name="TextBox 22">
+            <a:extLst>
+              <a:ext uri="{FF2B5EF4-FFF2-40B4-BE49-F238E27FC236}">
+                <a16:creationId xmlns:a16="http://schemas.microsoft.com/office/drawing/2014/main" id="{F1CCC18E-2398-5D97-6937-4FF3D5C826B2}"/>
+              </a:ext>
+            </a:extLst>
+          </p:cNvPr>
+          <p:cNvSpPr txBox="1"/>
+          <p:nvPr/>
+        </p:nvSpPr>
+        <p:spPr>
+          <a:xfrm>
+            <a:off x="364027" y="3814802"/>
+            <a:ext cx="1837421" cy="369332"/>
+          </a:xfrm>
+          <a:prstGeom prst="rect">
+            <a:avLst/>
+          </a:prstGeom>
+          <a:noFill/>
+        </p:spPr>
+        <p:txBody>
+          <a:bodyPr wrap="square" rtlCol="0">
+            <a:spAutoFit/>
+          </a:bodyPr>
+          <a:lstStyle/>
+          <a:p>
+            <a:r>
+              <a:rPr lang="en-US" dirty="0"/>
+              <a:t>Noise masker</a:t>
+            </a:r>
+          </a:p>
+        </p:txBody>
+      </p:sp>
+      <p:pic>
+        <p:nvPicPr>
+          <p:cNvPr id="25" name="Picture 24">
+            <a:extLst>
+              <a:ext uri="{FF2B5EF4-FFF2-40B4-BE49-F238E27FC236}">
+                <a16:creationId xmlns:a16="http://schemas.microsoft.com/office/drawing/2014/main" id="{E3B432D0-0C6B-B343-6B31-7C972210F553}"/>
+              </a:ext>
+            </a:extLst>
+          </p:cNvPr>
+          <p:cNvPicPr>
+            <a:picLocks noChangeAspect="1"/>
+          </p:cNvPicPr>
+          <p:nvPr/>
+        </p:nvPicPr>
+        <p:blipFill>
+          <a:blip r:embed="rId6"/>
+          <a:stretch>
+            <a:fillRect/>
+          </a:stretch>
+        </p:blipFill>
+        <p:spPr>
+          <a:xfrm>
+            <a:off x="158317" y="1478584"/>
+            <a:ext cx="2857712" cy="2231020"/>
+          </a:xfrm>
+          <a:prstGeom prst="rect">
+            <a:avLst/>
+          </a:prstGeom>
+        </p:spPr>
+      </p:pic>
+      <p:pic>
+        <p:nvPicPr>
+          <p:cNvPr id="27" name="Picture 26">
+            <a:extLst>
+              <a:ext uri="{FF2B5EF4-FFF2-40B4-BE49-F238E27FC236}">
+                <a16:creationId xmlns:a16="http://schemas.microsoft.com/office/drawing/2014/main" id="{ECA9F22E-18B1-CDE2-C73F-ED268BA12217}"/>
+              </a:ext>
+            </a:extLst>
+          </p:cNvPr>
+          <p:cNvPicPr>
+            <a:picLocks noChangeAspect="1"/>
+          </p:cNvPicPr>
+          <p:nvPr/>
+        </p:nvPicPr>
+        <p:blipFill>
+          <a:blip r:embed="rId7"/>
+          <a:stretch>
+            <a:fillRect/>
+          </a:stretch>
+        </p:blipFill>
+        <p:spPr>
+          <a:xfrm>
+            <a:off x="3016029" y="1478584"/>
+            <a:ext cx="2844802" cy="2195266"/>
+          </a:xfrm>
+          <a:prstGeom prst="rect">
+            <a:avLst/>
+          </a:prstGeom>
+        </p:spPr>
+      </p:pic>
+      <p:pic>
+        <p:nvPicPr>
+          <p:cNvPr id="29" name="Picture 28">
+            <a:extLst>
+              <a:ext uri="{FF2B5EF4-FFF2-40B4-BE49-F238E27FC236}">
+                <a16:creationId xmlns:a16="http://schemas.microsoft.com/office/drawing/2014/main" id="{579E7447-7235-F1C8-79C9-21E853BAC6EB}"/>
+              </a:ext>
+            </a:extLst>
+          </p:cNvPr>
+          <p:cNvPicPr>
+            <a:picLocks noChangeAspect="1"/>
+          </p:cNvPicPr>
+          <p:nvPr/>
+        </p:nvPicPr>
+        <p:blipFill>
+          <a:blip r:embed="rId8"/>
+          <a:stretch>
+            <a:fillRect/>
+          </a:stretch>
+        </p:blipFill>
+        <p:spPr>
+          <a:xfrm>
+            <a:off x="6096000" y="1478584"/>
+            <a:ext cx="3008788" cy="2328540"/>
+          </a:xfrm>
+          <a:prstGeom prst="rect">
+            <a:avLst/>
+          </a:prstGeom>
+        </p:spPr>
+      </p:pic>
+    </p:spTree>
+    <p:extLst>
+      <p:ext uri="{BB962C8B-B14F-4D97-AF65-F5344CB8AC3E}">
+        <p14:creationId xmlns:p14="http://schemas.microsoft.com/office/powerpoint/2010/main" val="2454698054"/>
+      </p:ext>
+    </p:extLst>
+  </p:cSld>
+  <p:clrMapOvr>
+    <a:masterClrMapping/>
+  </p:clrMapOvr>
+</p:sld>
+</file>
+
+<file path=ppt/slides/slide11.xml><?xml version="1.0" encoding="utf-8"?>
+<p:sld xmlns:a="http://schemas.openxmlformats.org/drawingml/2006/main" xmlns:r="http://schemas.openxmlformats.org/officeDocument/2006/relationships" xmlns:p="http://schemas.openxmlformats.org/presentationml/2006/main">
+  <p:cSld>
+    <p:spTree>
+      <p:nvGrpSpPr>
+        <p:cNvPr id="1" name=""/>
+        <p:cNvGrpSpPr/>
+        <p:nvPr/>
+      </p:nvGrpSpPr>
+      <p:grpSpPr>
+        <a:xfrm>
+          <a:off x="0" y="0"/>
+          <a:ext cx="0" cy="0"/>
+          <a:chOff x="0" y="0"/>
+          <a:chExt cx="0" cy="0"/>
+        </a:xfrm>
+      </p:grpSpPr>
+      <p:sp>
+        <p:nvSpPr>
+          <p:cNvPr id="2" name="Title 1">
+            <a:extLst>
+              <a:ext uri="{FF2B5EF4-FFF2-40B4-BE49-F238E27FC236}">
+                <a16:creationId xmlns:a16="http://schemas.microsoft.com/office/drawing/2014/main" id="{01AAF186-A7CB-8F9D-6786-97CA2C012479}"/>
+              </a:ext>
+            </a:extLst>
+          </p:cNvPr>
+          <p:cNvSpPr>
+            <a:spLocks noGrp="1"/>
+          </p:cNvSpPr>
+          <p:nvPr>
+            <p:ph type="title"/>
+          </p:nvPr>
+        </p:nvSpPr>
+        <p:spPr/>
+        <p:txBody>
+          <a:bodyPr/>
+          <a:lstStyle/>
+          <a:p>
+            <a:r>
+              <a:rPr lang="en-US" dirty="0"/>
+              <a:t>GLM Channel by Channel, across subjects</a:t>
+            </a:r>
+          </a:p>
+        </p:txBody>
+      </p:sp>
+      <p:sp>
+        <p:nvSpPr>
+          <p:cNvPr id="3" name="Content Placeholder 2">
+            <a:extLst>
+              <a:ext uri="{FF2B5EF4-FFF2-40B4-BE49-F238E27FC236}">
+                <a16:creationId xmlns:a16="http://schemas.microsoft.com/office/drawing/2014/main" id="{8661222C-D35E-816E-65F5-A8F84ECAE8B8}"/>
+              </a:ext>
+            </a:extLst>
+          </p:cNvPr>
+          <p:cNvSpPr>
+            <a:spLocks noGrp="1"/>
+          </p:cNvSpPr>
+          <p:nvPr>
+            <p:ph idx="1"/>
+          </p:nvPr>
+        </p:nvSpPr>
+        <p:spPr/>
+        <p:txBody>
+          <a:bodyPr/>
+          <a:lstStyle/>
+          <a:p>
+            <a:endParaRPr lang="en-US"/>
+          </a:p>
+        </p:txBody>
+      </p:sp>
+    </p:spTree>
+    <p:extLst>
+      <p:ext uri="{BB962C8B-B14F-4D97-AF65-F5344CB8AC3E}">
+        <p14:creationId xmlns:p14="http://schemas.microsoft.com/office/powerpoint/2010/main" val="15692493"/>
+      </p:ext>
+    </p:extLst>
+  </p:cSld>
+  <p:clrMapOvr>
+    <a:masterClrMapping/>
+  </p:clrMapOvr>
+</p:sld>
+</file>
+
+<file path=ppt/slides/slide12.xml><?xml version="1.0" encoding="utf-8"?>
+<p:sld xmlns:a="http://schemas.openxmlformats.org/drawingml/2006/main" xmlns:r="http://schemas.openxmlformats.org/officeDocument/2006/relationships" xmlns:p="http://schemas.openxmlformats.org/presentationml/2006/main">
+  <p:cSld>
+    <p:spTree>
+      <p:nvGrpSpPr>
+        <p:cNvPr id="1" name=""/>
+        <p:cNvGrpSpPr/>
+        <p:nvPr/>
+      </p:nvGrpSpPr>
+      <p:grpSpPr>
+        <a:xfrm>
+          <a:off x="0" y="0"/>
+          <a:ext cx="0" cy="0"/>
+          <a:chOff x="0" y="0"/>
+          <a:chExt cx="0" cy="0"/>
+        </a:xfrm>
+      </p:grpSpPr>
+      <p:sp>
+        <p:nvSpPr>
+          <p:cNvPr id="2" name="Title 1">
+            <a:extLst>
+              <a:ext uri="{FF2B5EF4-FFF2-40B4-BE49-F238E27FC236}">
+                <a16:creationId xmlns:a16="http://schemas.microsoft.com/office/drawing/2014/main" id="{80343B3E-3B81-7802-6F55-676A963D053B}"/>
+              </a:ext>
+            </a:extLst>
+          </p:cNvPr>
+          <p:cNvSpPr>
+            <a:spLocks noGrp="1"/>
+          </p:cNvSpPr>
+          <p:nvPr>
+            <p:ph type="title"/>
+          </p:nvPr>
+        </p:nvSpPr>
+        <p:spPr/>
+        <p:txBody>
+          <a:bodyPr/>
+          <a:lstStyle/>
+          <a:p>
+            <a:r>
+              <a:rPr lang="en-US" dirty="0"/>
+              <a:t>Mixed Effects Model Analysis (Mean </a:t>
+            </a:r>
+            <a:r>
+              <a:rPr lang="en-US" dirty="0" err="1"/>
+              <a:t>HbO</a:t>
+            </a:r>
+            <a:r>
+              <a:rPr lang="en-US" dirty="0"/>
+              <a:t>)</a:t>
+            </a:r>
+          </a:p>
+        </p:txBody>
+      </p:sp>
+      <p:sp>
+        <p:nvSpPr>
+          <p:cNvPr id="3" name="Content Placeholder 2">
+            <a:extLst>
+              <a:ext uri="{FF2B5EF4-FFF2-40B4-BE49-F238E27FC236}">
+                <a16:creationId xmlns:a16="http://schemas.microsoft.com/office/drawing/2014/main" id="{B77BFE24-49DE-2AB6-FDE5-A2AA3BF4B15D}"/>
+              </a:ext>
+            </a:extLst>
+          </p:cNvPr>
+          <p:cNvSpPr>
+            <a:spLocks noGrp="1"/>
+          </p:cNvSpPr>
+          <p:nvPr>
+            <p:ph idx="1"/>
+          </p:nvPr>
+        </p:nvSpPr>
+        <p:spPr/>
+        <p:txBody>
+          <a:bodyPr/>
+          <a:lstStyle/>
+          <a:p>
+            <a:endParaRPr lang="en-US"/>
+          </a:p>
+        </p:txBody>
+      </p:sp>
+    </p:spTree>
+    <p:extLst>
+      <p:ext uri="{BB962C8B-B14F-4D97-AF65-F5344CB8AC3E}">
+        <p14:creationId xmlns:p14="http://schemas.microsoft.com/office/powerpoint/2010/main" val="1614852943"/>
+      </p:ext>
+    </p:extLst>
+  </p:cSld>
+  <p:clrMapOvr>
+    <a:masterClrMapping/>
+  </p:clrMapOvr>
+</p:sld>
+</file>
+
+<file path=ppt/slides/slide13.xml><?xml version="1.0" encoding="utf-8"?>
+<p:sld xmlns:a="http://schemas.openxmlformats.org/drawingml/2006/main" xmlns:r="http://schemas.openxmlformats.org/officeDocument/2006/relationships" xmlns:p="http://schemas.openxmlformats.org/presentationml/2006/main">
+  <p:cSld>
+    <p:spTree>
+      <p:nvGrpSpPr>
+        <p:cNvPr id="1" name=""/>
+        <p:cNvGrpSpPr/>
+        <p:nvPr/>
+      </p:nvGrpSpPr>
+      <p:grpSpPr>
+        <a:xfrm>
+          <a:off x="0" y="0"/>
+          <a:ext cx="0" cy="0"/>
+          <a:chOff x="0" y="0"/>
+          <a:chExt cx="0" cy="0"/>
+        </a:xfrm>
+      </p:grpSpPr>
+      <p:sp>
+        <p:nvSpPr>
+          <p:cNvPr id="2" name="Title 1">
+            <a:extLst>
+              <a:ext uri="{FF2B5EF4-FFF2-40B4-BE49-F238E27FC236}">
+                <a16:creationId xmlns:a16="http://schemas.microsoft.com/office/drawing/2014/main" id="{80343B3E-3B81-7802-6F55-676A963D053B}"/>
+              </a:ext>
+            </a:extLst>
+          </p:cNvPr>
+          <p:cNvSpPr>
+            <a:spLocks noGrp="1"/>
+          </p:cNvSpPr>
+          <p:nvPr>
+            <p:ph type="title"/>
+          </p:nvPr>
+        </p:nvSpPr>
+        <p:spPr/>
+        <p:txBody>
+          <a:bodyPr/>
+          <a:lstStyle/>
+          <a:p>
+            <a:r>
+              <a:rPr lang="en-US" dirty="0"/>
+              <a:t>Mixed Effects Model Analysis (Beta)</a:t>
+            </a:r>
+          </a:p>
+        </p:txBody>
+      </p:sp>
+      <p:sp>
+        <p:nvSpPr>
+          <p:cNvPr id="3" name="Content Placeholder 2">
+            <a:extLst>
+              <a:ext uri="{FF2B5EF4-FFF2-40B4-BE49-F238E27FC236}">
+                <a16:creationId xmlns:a16="http://schemas.microsoft.com/office/drawing/2014/main" id="{B77BFE24-49DE-2AB6-FDE5-A2AA3BF4B15D}"/>
+              </a:ext>
+            </a:extLst>
+          </p:cNvPr>
+          <p:cNvSpPr>
+            <a:spLocks noGrp="1"/>
+          </p:cNvSpPr>
+          <p:nvPr>
+            <p:ph idx="1"/>
+          </p:nvPr>
+        </p:nvSpPr>
+        <p:spPr/>
+        <p:txBody>
+          <a:bodyPr/>
+          <a:lstStyle/>
+          <a:p>
+            <a:endParaRPr lang="en-US"/>
+          </a:p>
+        </p:txBody>
+      </p:sp>
+    </p:spTree>
+    <p:extLst>
+      <p:ext uri="{BB962C8B-B14F-4D97-AF65-F5344CB8AC3E}">
+        <p14:creationId xmlns:p14="http://schemas.microsoft.com/office/powerpoint/2010/main" val="2189436101"/>
+      </p:ext>
+    </p:extLst>
+  </p:cSld>
+  <p:clrMapOvr>
+    <a:masterClrMapping/>
+  </p:clrMapOvr>
+</p:sld>
+</file>
+
 <file path=ppt/slides/slide2.xml><?xml version="1.0" encoding="utf-8"?>
 <p:sld xmlns:a="http://schemas.openxmlformats.org/drawingml/2006/main" xmlns:r="http://schemas.openxmlformats.org/officeDocument/2006/relationships" xmlns:p="http://schemas.openxmlformats.org/presentationml/2006/main">
   <p:cSld>
@@ -3431,7 +4048,12 @@
             <p:ph type="title"/>
           </p:nvPr>
         </p:nvSpPr>
-        <p:spPr/>
+        <p:spPr>
+          <a:xfrm>
+            <a:off x="838200" y="259079"/>
+            <a:ext cx="10515600" cy="843915"/>
+          </a:xfrm>
+        </p:spPr>
         <p:txBody>
           <a:bodyPr/>
           <a:lstStyle/>
@@ -3464,7 +4086,7 @@
           <a:bodyPr/>
           <a:lstStyle/>
           <a:p>
-            <a:endParaRPr lang="en-US"/>
+            <a:endParaRPr lang="en-US" dirty="0"/>
           </a:p>
         </p:txBody>
       </p:sp>
@@ -3516,8 +4138,8 @@
         </p:nvSpPr>
         <p:spPr>
           <a:xfrm>
-            <a:off x="838200" y="212725"/>
-            <a:ext cx="10515600" cy="1325563"/>
+            <a:off x="838200" y="-46269"/>
+            <a:ext cx="7604760" cy="701675"/>
           </a:xfrm>
         </p:spPr>
         <p:txBody>
@@ -3526,41 +4148,101 @@
           <a:p>
             <a:r>
               <a:rPr lang="en-US" dirty="0"/>
-              <a:t>Block average </a:t>
-            </a:r>
-            <a:r>
-              <a:rPr lang="en-US" dirty="0" err="1"/>
-              <a:t>topoplots</a:t>
-            </a:r>
-            <a:endParaRPr lang="en-US" dirty="0"/>
-          </a:p>
-        </p:txBody>
-      </p:sp>
-      <p:sp>
-        <p:nvSpPr>
-          <p:cNvPr id="3" name="Content Placeholder 2">
-            <a:extLst>
-              <a:ext uri="{FF2B5EF4-FFF2-40B4-BE49-F238E27FC236}">
-                <a16:creationId xmlns:a16="http://schemas.microsoft.com/office/drawing/2014/main" id="{8EE3472F-A5F5-4E8A-E2F0-9C91311633A0}"/>
-              </a:ext>
-            </a:extLst>
-          </p:cNvPr>
-          <p:cNvSpPr>
-            <a:spLocks noGrp="1"/>
-          </p:cNvSpPr>
-          <p:nvPr>
-            <p:ph idx="1"/>
-          </p:nvPr>
-        </p:nvSpPr>
-        <p:spPr/>
-        <p:txBody>
-          <a:bodyPr/>
-          <a:lstStyle/>
-          <a:p>
-            <a:endParaRPr lang="en-US" dirty="0"/>
-          </a:p>
-        </p:txBody>
-      </p:sp>
+              <a:t>Block averages by channel (PFC)</a:t>
+            </a:r>
+          </a:p>
+        </p:txBody>
+      </p:sp>
+      <p:pic>
+        <p:nvPicPr>
+          <p:cNvPr id="17" name="Picture 16">
+            <a:extLst>
+              <a:ext uri="{FF2B5EF4-FFF2-40B4-BE49-F238E27FC236}">
+                <a16:creationId xmlns:a16="http://schemas.microsoft.com/office/drawing/2014/main" id="{CBFAF68C-639C-1E7C-239A-1B00377EC731}"/>
+              </a:ext>
+            </a:extLst>
+          </p:cNvPr>
+          <p:cNvPicPr>
+            <a:picLocks noChangeAspect="1"/>
+          </p:cNvPicPr>
+          <p:nvPr/>
+        </p:nvPicPr>
+        <p:blipFill>
+          <a:blip r:embed="rId2"/>
+          <a:stretch>
+            <a:fillRect/>
+          </a:stretch>
+        </p:blipFill>
+        <p:spPr>
+          <a:xfrm>
+            <a:off x="477520" y="452796"/>
+            <a:ext cx="11480800" cy="2157612"/>
+          </a:xfrm>
+          <a:prstGeom prst="rect">
+            <a:avLst/>
+          </a:prstGeom>
+        </p:spPr>
+      </p:pic>
+      <p:pic>
+        <p:nvPicPr>
+          <p:cNvPr id="19" name="Picture 18">
+            <a:extLst>
+              <a:ext uri="{FF2B5EF4-FFF2-40B4-BE49-F238E27FC236}">
+                <a16:creationId xmlns:a16="http://schemas.microsoft.com/office/drawing/2014/main" id="{700E8B35-2FE9-7907-48EE-65579EA611BD}"/>
+              </a:ext>
+            </a:extLst>
+          </p:cNvPr>
+          <p:cNvPicPr>
+            <a:picLocks noChangeAspect="1"/>
+          </p:cNvPicPr>
+          <p:nvPr/>
+        </p:nvPicPr>
+        <p:blipFill>
+          <a:blip r:embed="rId3"/>
+          <a:stretch>
+            <a:fillRect/>
+          </a:stretch>
+        </p:blipFill>
+        <p:spPr>
+          <a:xfrm>
+            <a:off x="477520" y="2641873"/>
+            <a:ext cx="11480800" cy="2127938"/>
+          </a:xfrm>
+          <a:prstGeom prst="rect">
+            <a:avLst/>
+          </a:prstGeom>
+        </p:spPr>
+      </p:pic>
+      <p:pic>
+        <p:nvPicPr>
+          <p:cNvPr id="21" name="Picture 20">
+            <a:extLst>
+              <a:ext uri="{FF2B5EF4-FFF2-40B4-BE49-F238E27FC236}">
+                <a16:creationId xmlns:a16="http://schemas.microsoft.com/office/drawing/2014/main" id="{3ED3110C-31E1-0EC1-E2C4-A073D8FE1865}"/>
+              </a:ext>
+            </a:extLst>
+          </p:cNvPr>
+          <p:cNvPicPr>
+            <a:picLocks noChangeAspect="1"/>
+          </p:cNvPicPr>
+          <p:nvPr/>
+        </p:nvPicPr>
+        <p:blipFill>
+          <a:blip r:embed="rId4"/>
+          <a:stretch>
+            <a:fillRect/>
+          </a:stretch>
+        </p:blipFill>
+        <p:spPr>
+          <a:xfrm>
+            <a:off x="396240" y="4720694"/>
+            <a:ext cx="11480800" cy="2137306"/>
+          </a:xfrm>
+          <a:prstGeom prst="rect">
+            <a:avLst/>
+          </a:prstGeom>
+        </p:spPr>
+      </p:pic>
     </p:spTree>
     <p:extLst>
       <p:ext uri="{BB962C8B-B14F-4D97-AF65-F5344CB8AC3E}">
@@ -3593,10 +4275,10 @@
       </p:grpSpPr>
       <p:sp>
         <p:nvSpPr>
-          <p:cNvPr id="2" name="Title 1">
-            <a:extLst>
-              <a:ext uri="{FF2B5EF4-FFF2-40B4-BE49-F238E27FC236}">
-                <a16:creationId xmlns:a16="http://schemas.microsoft.com/office/drawing/2014/main" id="{29AF55CE-0436-2773-4527-649CC18DD771}"/>
+          <p:cNvPr id="4" name="Title 1">
+            <a:extLst>
+              <a:ext uri="{FF2B5EF4-FFF2-40B4-BE49-F238E27FC236}">
+                <a16:creationId xmlns:a16="http://schemas.microsoft.com/office/drawing/2014/main" id="{BF777B0F-4011-A720-0F02-653DA1880CA0}"/>
               </a:ext>
             </a:extLst>
           </p:cNvPr>
@@ -3607,55 +4289,125 @@
             <p:ph type="title"/>
           </p:nvPr>
         </p:nvSpPr>
-        <p:spPr/>
+        <p:spPr>
+          <a:xfrm>
+            <a:off x="838200" y="29845"/>
+            <a:ext cx="10515600" cy="701675"/>
+          </a:xfrm>
+        </p:spPr>
         <p:txBody>
           <a:bodyPr/>
           <a:lstStyle/>
           <a:p>
             <a:r>
               <a:rPr lang="en-US" dirty="0"/>
-              <a:t>Block average </a:t>
+              <a:t>Block averages by channel (PFC </a:t>
             </a:r>
             <a:r>
               <a:rPr lang="en-US" dirty="0" err="1"/>
-              <a:t>topoplots</a:t>
+              <a:t>cont</a:t>
             </a:r>
             <a:r>
               <a:rPr lang="en-US" dirty="0"/>
-              <a:t> (BH corrected)</a:t>
-            </a:r>
-          </a:p>
-        </p:txBody>
-      </p:sp>
-      <p:sp>
-        <p:nvSpPr>
-          <p:cNvPr id="3" name="Content Placeholder 2">
-            <a:extLst>
-              <a:ext uri="{FF2B5EF4-FFF2-40B4-BE49-F238E27FC236}">
-                <a16:creationId xmlns:a16="http://schemas.microsoft.com/office/drawing/2014/main" id="{4045D7C7-8831-D53B-3B56-0486A15439FB}"/>
-              </a:ext>
-            </a:extLst>
-          </p:cNvPr>
-          <p:cNvSpPr>
-            <a:spLocks noGrp="1"/>
-          </p:cNvSpPr>
-          <p:nvPr>
-            <p:ph idx="1"/>
-          </p:nvPr>
-        </p:nvSpPr>
-        <p:spPr/>
-        <p:txBody>
-          <a:bodyPr/>
-          <a:lstStyle/>
-          <a:p>
-            <a:endParaRPr lang="en-US"/>
-          </a:p>
-        </p:txBody>
-      </p:sp>
+              <a:t>)</a:t>
+            </a:r>
+          </a:p>
+        </p:txBody>
+      </p:sp>
+      <p:pic>
+        <p:nvPicPr>
+          <p:cNvPr id="18" name="Picture 17">
+            <a:extLst>
+              <a:ext uri="{FF2B5EF4-FFF2-40B4-BE49-F238E27FC236}">
+                <a16:creationId xmlns:a16="http://schemas.microsoft.com/office/drawing/2014/main" id="{52ACAAAF-7ADC-06DC-A825-CDF845BB112F}"/>
+              </a:ext>
+            </a:extLst>
+          </p:cNvPr>
+          <p:cNvPicPr>
+            <a:picLocks noChangeAspect="1"/>
+          </p:cNvPicPr>
+          <p:nvPr/>
+        </p:nvPicPr>
+        <p:blipFill>
+          <a:blip r:embed="rId2"/>
+          <a:stretch>
+            <a:fillRect/>
+          </a:stretch>
+        </p:blipFill>
+        <p:spPr>
+          <a:xfrm>
+            <a:off x="523240" y="731520"/>
+            <a:ext cx="11145520" cy="2082819"/>
+          </a:xfrm>
+          <a:prstGeom prst="rect">
+            <a:avLst/>
+          </a:prstGeom>
+        </p:spPr>
+      </p:pic>
+      <p:pic>
+        <p:nvPicPr>
+          <p:cNvPr id="20" name="Picture 19">
+            <a:extLst>
+              <a:ext uri="{FF2B5EF4-FFF2-40B4-BE49-F238E27FC236}">
+                <a16:creationId xmlns:a16="http://schemas.microsoft.com/office/drawing/2014/main" id="{79DF8ABE-2048-078E-EDE4-47DAA0747979}"/>
+              </a:ext>
+            </a:extLst>
+          </p:cNvPr>
+          <p:cNvPicPr>
+            <a:picLocks noChangeAspect="1"/>
+          </p:cNvPicPr>
+          <p:nvPr/>
+        </p:nvPicPr>
+        <p:blipFill>
+          <a:blip r:embed="rId3"/>
+          <a:stretch>
+            <a:fillRect/>
+          </a:stretch>
+        </p:blipFill>
+        <p:spPr>
+          <a:xfrm>
+            <a:off x="523240" y="2666038"/>
+            <a:ext cx="11145520" cy="2072774"/>
+          </a:xfrm>
+          <a:prstGeom prst="rect">
+            <a:avLst/>
+          </a:prstGeom>
+        </p:spPr>
+      </p:pic>
+      <p:pic>
+        <p:nvPicPr>
+          <p:cNvPr id="22" name="Picture 21">
+            <a:extLst>
+              <a:ext uri="{FF2B5EF4-FFF2-40B4-BE49-F238E27FC236}">
+                <a16:creationId xmlns:a16="http://schemas.microsoft.com/office/drawing/2014/main" id="{64E511FE-243B-513C-2CA9-83395E706F1C}"/>
+              </a:ext>
+            </a:extLst>
+          </p:cNvPr>
+          <p:cNvPicPr>
+            <a:picLocks noChangeAspect="1"/>
+          </p:cNvPicPr>
+          <p:nvPr/>
+        </p:nvPicPr>
+        <p:blipFill>
+          <a:blip r:embed="rId4"/>
+          <a:stretch>
+            <a:fillRect/>
+          </a:stretch>
+        </p:blipFill>
+        <p:spPr>
+          <a:xfrm>
+            <a:off x="523240" y="4607535"/>
+            <a:ext cx="11145520" cy="2065795"/>
+          </a:xfrm>
+          <a:prstGeom prst="rect">
+            <a:avLst/>
+          </a:prstGeom>
+        </p:spPr>
+      </p:pic>
     </p:spTree>
     <p:extLst>
       <p:ext uri="{BB962C8B-B14F-4D97-AF65-F5344CB8AC3E}">
-        <p14:creationId xmlns:p14="http://schemas.microsoft.com/office/powerpoint/2010/main" val="1713963719"/>
+        <p14:creationId xmlns:p14="http://schemas.microsoft.com/office/powerpoint/2010/main" val="2628261487"/>
       </p:ext>
     </p:extLst>
   </p:cSld>
@@ -3684,10 +4436,10 @@
       </p:grpSpPr>
       <p:sp>
         <p:nvSpPr>
-          <p:cNvPr id="2" name="Title 1">
-            <a:extLst>
-              <a:ext uri="{FF2B5EF4-FFF2-40B4-BE49-F238E27FC236}">
-                <a16:creationId xmlns:a16="http://schemas.microsoft.com/office/drawing/2014/main" id="{7A4511FE-55EB-7D42-60EE-3058B3C98E98}"/>
+          <p:cNvPr id="4" name="Title 1">
+            <a:extLst>
+              <a:ext uri="{FF2B5EF4-FFF2-40B4-BE49-F238E27FC236}">
+                <a16:creationId xmlns:a16="http://schemas.microsoft.com/office/drawing/2014/main" id="{159FE0E1-7ABA-F1DA-7A1E-01E3712222C0}"/>
               </a:ext>
             </a:extLst>
           </p:cNvPr>
@@ -3698,60 +4450,149 @@
             <p:ph type="title"/>
           </p:nvPr>
         </p:nvSpPr>
-        <p:spPr/>
-        <p:txBody>
-          <a:bodyPr/>
+        <p:spPr>
+          <a:xfrm>
+            <a:off x="838200" y="-46269"/>
+            <a:ext cx="8376920" cy="701675"/>
+          </a:xfrm>
+        </p:spPr>
+        <p:txBody>
+          <a:bodyPr>
+            <a:normAutofit fontScale="90000"/>
+          </a:bodyPr>
           <a:lstStyle/>
           <a:p>
             <a:r>
               <a:rPr lang="en-US" dirty="0"/>
-              <a:t>Mean </a:t>
-            </a:r>
-            <a:r>
-              <a:rPr lang="en-US" dirty="0" err="1"/>
-              <a:t>HbO</a:t>
-            </a:r>
-            <a:r>
-              <a:rPr lang="en-US" dirty="0"/>
-              <a:t> </a:t>
-            </a:r>
-            <a:r>
-              <a:rPr lang="en-US" dirty="0" err="1"/>
-              <a:t>topoplots</a:t>
-            </a:r>
-            <a:endParaRPr lang="en-US" dirty="0"/>
-          </a:p>
-        </p:txBody>
-      </p:sp>
-      <p:sp>
-        <p:nvSpPr>
-          <p:cNvPr id="3" name="Content Placeholder 2">
-            <a:extLst>
-              <a:ext uri="{FF2B5EF4-FFF2-40B4-BE49-F238E27FC236}">
-                <a16:creationId xmlns:a16="http://schemas.microsoft.com/office/drawing/2014/main" id="{FB6FBE8C-A3C2-EE85-BF3E-AA502EAA9C1F}"/>
-              </a:ext>
-            </a:extLst>
-          </p:cNvPr>
-          <p:cNvSpPr>
-            <a:spLocks noGrp="1"/>
-          </p:cNvSpPr>
-          <p:nvPr>
-            <p:ph idx="1"/>
-          </p:nvPr>
-        </p:nvSpPr>
-        <p:spPr/>
-        <p:txBody>
-          <a:bodyPr/>
-          <a:lstStyle/>
-          <a:p>
-            <a:endParaRPr lang="en-US"/>
-          </a:p>
-        </p:txBody>
-      </p:sp>
+              <a:t>Block averages by channel (STG Left)</a:t>
+            </a:r>
+          </a:p>
+        </p:txBody>
+      </p:sp>
+      <p:pic>
+        <p:nvPicPr>
+          <p:cNvPr id="12" name="Picture 11">
+            <a:extLst>
+              <a:ext uri="{FF2B5EF4-FFF2-40B4-BE49-F238E27FC236}">
+                <a16:creationId xmlns:a16="http://schemas.microsoft.com/office/drawing/2014/main" id="{C437ED37-70E6-7AC1-23ED-5D26701BC1D2}"/>
+              </a:ext>
+            </a:extLst>
+          </p:cNvPr>
+          <p:cNvPicPr>
+            <a:picLocks noChangeAspect="1"/>
+          </p:cNvPicPr>
+          <p:nvPr/>
+        </p:nvPicPr>
+        <p:blipFill>
+          <a:blip r:embed="rId2"/>
+          <a:stretch>
+            <a:fillRect/>
+          </a:stretch>
+        </p:blipFill>
+        <p:spPr>
+          <a:xfrm>
+            <a:off x="1832344" y="655406"/>
+            <a:ext cx="8376920" cy="1532619"/>
+          </a:xfrm>
+          <a:prstGeom prst="rect">
+            <a:avLst/>
+          </a:prstGeom>
+        </p:spPr>
+      </p:pic>
+      <p:pic>
+        <p:nvPicPr>
+          <p:cNvPr id="14" name="Picture 13">
+            <a:extLst>
+              <a:ext uri="{FF2B5EF4-FFF2-40B4-BE49-F238E27FC236}">
+                <a16:creationId xmlns:a16="http://schemas.microsoft.com/office/drawing/2014/main" id="{3C6BE627-E8EA-45CF-2CAB-D904B12F23E5}"/>
+              </a:ext>
+            </a:extLst>
+          </p:cNvPr>
+          <p:cNvPicPr>
+            <a:picLocks noChangeAspect="1"/>
+          </p:cNvPicPr>
+          <p:nvPr/>
+        </p:nvPicPr>
+        <p:blipFill>
+          <a:blip r:embed="rId3"/>
+          <a:stretch>
+            <a:fillRect/>
+          </a:stretch>
+        </p:blipFill>
+        <p:spPr>
+          <a:xfrm>
+            <a:off x="1832344" y="2188025"/>
+            <a:ext cx="8376920" cy="1583828"/>
+          </a:xfrm>
+          <a:prstGeom prst="rect">
+            <a:avLst/>
+          </a:prstGeom>
+        </p:spPr>
+      </p:pic>
+      <p:pic>
+        <p:nvPicPr>
+          <p:cNvPr id="16" name="Picture 15">
+            <a:extLst>
+              <a:ext uri="{FF2B5EF4-FFF2-40B4-BE49-F238E27FC236}">
+                <a16:creationId xmlns:a16="http://schemas.microsoft.com/office/drawing/2014/main" id="{5D198A49-9E69-4235-A209-BDADA9554043}"/>
+              </a:ext>
+            </a:extLst>
+          </p:cNvPr>
+          <p:cNvPicPr>
+            <a:picLocks noChangeAspect="1"/>
+          </p:cNvPicPr>
+          <p:nvPr/>
+        </p:nvPicPr>
+        <p:blipFill>
+          <a:blip r:embed="rId4"/>
+          <a:stretch>
+            <a:fillRect/>
+          </a:stretch>
+        </p:blipFill>
+        <p:spPr>
+          <a:xfrm>
+            <a:off x="1772172" y="3634357"/>
+            <a:ext cx="8376920" cy="1551282"/>
+          </a:xfrm>
+          <a:prstGeom prst="rect">
+            <a:avLst/>
+          </a:prstGeom>
+        </p:spPr>
+      </p:pic>
+      <p:pic>
+        <p:nvPicPr>
+          <p:cNvPr id="18" name="Picture 17">
+            <a:extLst>
+              <a:ext uri="{FF2B5EF4-FFF2-40B4-BE49-F238E27FC236}">
+                <a16:creationId xmlns:a16="http://schemas.microsoft.com/office/drawing/2014/main" id="{0015C12C-7CDD-EBB3-B7FE-66E09C5B9C38}"/>
+              </a:ext>
+            </a:extLst>
+          </p:cNvPr>
+          <p:cNvPicPr>
+            <a:picLocks noChangeAspect="1"/>
+          </p:cNvPicPr>
+          <p:nvPr/>
+        </p:nvPicPr>
+        <p:blipFill>
+          <a:blip r:embed="rId5"/>
+          <a:stretch>
+            <a:fillRect/>
+          </a:stretch>
+        </p:blipFill>
+        <p:spPr>
+          <a:xfrm>
+            <a:off x="1719136" y="5166976"/>
+            <a:ext cx="8490128" cy="1593564"/>
+          </a:xfrm>
+          <a:prstGeom prst="rect">
+            <a:avLst/>
+          </a:prstGeom>
+        </p:spPr>
+      </p:pic>
     </p:spTree>
     <p:extLst>
       <p:ext uri="{BB962C8B-B14F-4D97-AF65-F5344CB8AC3E}">
-        <p14:creationId xmlns:p14="http://schemas.microsoft.com/office/powerpoint/2010/main" val="469896196"/>
+        <p14:creationId xmlns:p14="http://schemas.microsoft.com/office/powerpoint/2010/main" val="27210607"/>
       </p:ext>
     </p:extLst>
   </p:cSld>
@@ -3780,10 +4621,10 @@
       </p:grpSpPr>
       <p:sp>
         <p:nvSpPr>
-          <p:cNvPr id="2" name="Title 1">
-            <a:extLst>
-              <a:ext uri="{FF2B5EF4-FFF2-40B4-BE49-F238E27FC236}">
-                <a16:creationId xmlns:a16="http://schemas.microsoft.com/office/drawing/2014/main" id="{7D982123-15B2-1432-2665-37AFC5D3121A}"/>
+          <p:cNvPr id="4" name="Title 1">
+            <a:extLst>
+              <a:ext uri="{FF2B5EF4-FFF2-40B4-BE49-F238E27FC236}">
+                <a16:creationId xmlns:a16="http://schemas.microsoft.com/office/drawing/2014/main" id="{2E684FBC-5142-18A9-9AA1-627E4D1B2044}"/>
               </a:ext>
             </a:extLst>
           </p:cNvPr>
@@ -3796,102 +4637,29 @@
         </p:nvSpPr>
         <p:spPr>
           <a:xfrm>
-            <a:off x="838200" y="0"/>
-            <a:ext cx="10515600" cy="1325563"/>
-          </a:xfrm>
-        </p:spPr>
-        <p:txBody>
-          <a:bodyPr/>
+            <a:off x="838200" y="-46269"/>
+            <a:ext cx="8986520" cy="701675"/>
+          </a:xfrm>
+        </p:spPr>
+        <p:txBody>
+          <a:bodyPr>
+            <a:normAutofit/>
+          </a:bodyPr>
           <a:lstStyle/>
           <a:p>
             <a:r>
               <a:rPr lang="en-US" dirty="0"/>
-              <a:t>GLM </a:t>
-            </a:r>
-            <a:r>
-              <a:rPr lang="en-US" dirty="0" err="1"/>
-              <a:t>topoplots</a:t>
-            </a:r>
-            <a:endParaRPr lang="en-US" dirty="0"/>
-          </a:p>
-        </p:txBody>
-      </p:sp>
-      <p:sp>
-        <p:nvSpPr>
-          <p:cNvPr id="10" name="TextBox 9">
-            <a:extLst>
-              <a:ext uri="{FF2B5EF4-FFF2-40B4-BE49-F238E27FC236}">
-                <a16:creationId xmlns:a16="http://schemas.microsoft.com/office/drawing/2014/main" id="{333A7074-FAA7-39C8-2789-A75504149594}"/>
-              </a:ext>
-            </a:extLst>
-          </p:cNvPr>
-          <p:cNvSpPr txBox="1"/>
-          <p:nvPr/>
-        </p:nvSpPr>
-        <p:spPr>
-          <a:xfrm>
-            <a:off x="364028" y="956231"/>
-            <a:ext cx="1837421" cy="369332"/>
-          </a:xfrm>
-          <a:prstGeom prst="rect">
-            <a:avLst/>
-          </a:prstGeom>
-          <a:noFill/>
-        </p:spPr>
-        <p:txBody>
-          <a:bodyPr wrap="square" rtlCol="0">
-            <a:spAutoFit/>
-          </a:bodyPr>
-          <a:lstStyle/>
-          <a:p>
-            <a:r>
-              <a:rPr lang="en-US" dirty="0"/>
-              <a:t>Speech masker</a:t>
-            </a:r>
-          </a:p>
-        </p:txBody>
-      </p:sp>
-      <p:sp>
-        <p:nvSpPr>
-          <p:cNvPr id="21" name="TextBox 20">
-            <a:extLst>
-              <a:ext uri="{FF2B5EF4-FFF2-40B4-BE49-F238E27FC236}">
-                <a16:creationId xmlns:a16="http://schemas.microsoft.com/office/drawing/2014/main" id="{4DAA716A-D4C9-DF2C-19F5-01F3E91CE933}"/>
-              </a:ext>
-            </a:extLst>
-          </p:cNvPr>
-          <p:cNvSpPr txBox="1"/>
-          <p:nvPr/>
-        </p:nvSpPr>
-        <p:spPr>
-          <a:xfrm>
-            <a:off x="364028" y="3910620"/>
-            <a:ext cx="1837421" cy="369332"/>
-          </a:xfrm>
-          <a:prstGeom prst="rect">
-            <a:avLst/>
-          </a:prstGeom>
-          <a:noFill/>
-        </p:spPr>
-        <p:txBody>
-          <a:bodyPr wrap="square" rtlCol="0">
-            <a:spAutoFit/>
-          </a:bodyPr>
-          <a:lstStyle/>
-          <a:p>
-            <a:r>
-              <a:rPr lang="en-US" dirty="0"/>
-              <a:t>Noise masker</a:t>
+              <a:t>Block averages by channel (STG Right)</a:t>
             </a:r>
           </a:p>
         </p:txBody>
       </p:sp>
       <p:pic>
         <p:nvPicPr>
-          <p:cNvPr id="27" name="Picture 26">
-            <a:extLst>
-              <a:ext uri="{FF2B5EF4-FFF2-40B4-BE49-F238E27FC236}">
-                <a16:creationId xmlns:a16="http://schemas.microsoft.com/office/drawing/2014/main" id="{F01F33EF-9D02-703E-72EA-9D000BBAC166}"/>
+          <p:cNvPr id="12" name="Picture 11">
+            <a:extLst>
+              <a:ext uri="{FF2B5EF4-FFF2-40B4-BE49-F238E27FC236}">
+                <a16:creationId xmlns:a16="http://schemas.microsoft.com/office/drawing/2014/main" id="{A769FA23-FFCB-1A6A-983C-62A8EDB5BC5C}"/>
               </a:ext>
             </a:extLst>
           </p:cNvPr>
@@ -3908,8 +4676,8 @@
         </p:blipFill>
         <p:spPr>
           <a:xfrm>
-            <a:off x="364028" y="4279952"/>
-            <a:ext cx="2820844" cy="2355016"/>
+            <a:off x="1483360" y="649168"/>
+            <a:ext cx="9225280" cy="1718889"/>
           </a:xfrm>
           <a:prstGeom prst="rect">
             <a:avLst/>
@@ -3918,10 +4686,10 @@
       </p:pic>
       <p:pic>
         <p:nvPicPr>
-          <p:cNvPr id="29" name="Picture 28">
-            <a:extLst>
-              <a:ext uri="{FF2B5EF4-FFF2-40B4-BE49-F238E27FC236}">
-                <a16:creationId xmlns:a16="http://schemas.microsoft.com/office/drawing/2014/main" id="{9CC59EEB-4CA3-6FC9-2A8C-3835D3979562}"/>
+          <p:cNvPr id="14" name="Picture 13">
+            <a:extLst>
+              <a:ext uri="{FF2B5EF4-FFF2-40B4-BE49-F238E27FC236}">
+                <a16:creationId xmlns:a16="http://schemas.microsoft.com/office/drawing/2014/main" id="{D311B9B1-847E-1D83-77A9-99897B798A89}"/>
               </a:ext>
             </a:extLst>
           </p:cNvPr>
@@ -3938,8 +4706,8 @@
         </p:blipFill>
         <p:spPr>
           <a:xfrm>
-            <a:off x="3184872" y="4279952"/>
-            <a:ext cx="2945414" cy="2459016"/>
+            <a:off x="1402080" y="2195368"/>
+            <a:ext cx="9225280" cy="1736251"/>
           </a:xfrm>
           <a:prstGeom prst="rect">
             <a:avLst/>
@@ -3948,10 +4716,10 @@
       </p:pic>
       <p:pic>
         <p:nvPicPr>
-          <p:cNvPr id="31" name="Picture 30">
-            <a:extLst>
-              <a:ext uri="{FF2B5EF4-FFF2-40B4-BE49-F238E27FC236}">
-                <a16:creationId xmlns:a16="http://schemas.microsoft.com/office/drawing/2014/main" id="{1225F699-3A16-CE02-C9DD-DCD98B6CE9CD}"/>
+          <p:cNvPr id="16" name="Picture 15">
+            <a:extLst>
+              <a:ext uri="{FF2B5EF4-FFF2-40B4-BE49-F238E27FC236}">
+                <a16:creationId xmlns:a16="http://schemas.microsoft.com/office/drawing/2014/main" id="{1FBD4C10-FD20-666D-EC29-ADD03E4F3B24}"/>
               </a:ext>
             </a:extLst>
           </p:cNvPr>
@@ -3968,8 +4736,8 @@
         </p:blipFill>
         <p:spPr>
           <a:xfrm>
-            <a:off x="6130286" y="4382562"/>
-            <a:ext cx="2822508" cy="2356406"/>
+            <a:off x="1402080" y="3840665"/>
+            <a:ext cx="9225280" cy="1683107"/>
           </a:xfrm>
           <a:prstGeom prst="rect">
             <a:avLst/>
@@ -3978,10 +4746,10 @@
       </p:pic>
       <p:pic>
         <p:nvPicPr>
-          <p:cNvPr id="33" name="Picture 32">
-            <a:extLst>
-              <a:ext uri="{FF2B5EF4-FFF2-40B4-BE49-F238E27FC236}">
-                <a16:creationId xmlns:a16="http://schemas.microsoft.com/office/drawing/2014/main" id="{10E26111-D51A-9A87-79F3-CB08DD72147E}"/>
+          <p:cNvPr id="18" name="Picture 17">
+            <a:extLst>
+              <a:ext uri="{FF2B5EF4-FFF2-40B4-BE49-F238E27FC236}">
+                <a16:creationId xmlns:a16="http://schemas.microsoft.com/office/drawing/2014/main" id="{17500730-FF23-F23A-C8BA-9786282DA5D9}"/>
               </a:ext>
             </a:extLst>
           </p:cNvPr>
@@ -3998,128 +4766,8 @@
         </p:blipFill>
         <p:spPr>
           <a:xfrm>
-            <a:off x="9097710" y="4382562"/>
-            <a:ext cx="2912138" cy="2431236"/>
-          </a:xfrm>
-          <a:prstGeom prst="rect">
-            <a:avLst/>
-          </a:prstGeom>
-        </p:spPr>
-      </p:pic>
-      <p:pic>
-        <p:nvPicPr>
-          <p:cNvPr id="35" name="Picture 34">
-            <a:extLst>
-              <a:ext uri="{FF2B5EF4-FFF2-40B4-BE49-F238E27FC236}">
-                <a16:creationId xmlns:a16="http://schemas.microsoft.com/office/drawing/2014/main" id="{80CAD29F-88AE-4723-EFAC-F8BB17F74CAB}"/>
-              </a:ext>
-            </a:extLst>
-          </p:cNvPr>
-          <p:cNvPicPr>
-            <a:picLocks noChangeAspect="1"/>
-          </p:cNvPicPr>
-          <p:nvPr/>
-        </p:nvPicPr>
-        <p:blipFill>
-          <a:blip r:embed="rId6"/>
-          <a:stretch>
-            <a:fillRect/>
-          </a:stretch>
-        </p:blipFill>
-        <p:spPr>
-          <a:xfrm>
-            <a:off x="285237" y="1419632"/>
-            <a:ext cx="2762518" cy="2306322"/>
-          </a:xfrm>
-          <a:prstGeom prst="rect">
-            <a:avLst/>
-          </a:prstGeom>
-        </p:spPr>
-      </p:pic>
-      <p:pic>
-        <p:nvPicPr>
-          <p:cNvPr id="37" name="Picture 36">
-            <a:extLst>
-              <a:ext uri="{FF2B5EF4-FFF2-40B4-BE49-F238E27FC236}">
-                <a16:creationId xmlns:a16="http://schemas.microsoft.com/office/drawing/2014/main" id="{E7673780-6817-483B-CF1E-9F705A80C046}"/>
-              </a:ext>
-            </a:extLst>
-          </p:cNvPr>
-          <p:cNvPicPr>
-            <a:picLocks noChangeAspect="1"/>
-          </p:cNvPicPr>
-          <p:nvPr/>
-        </p:nvPicPr>
-        <p:blipFill>
-          <a:blip r:embed="rId7"/>
-          <a:stretch>
-            <a:fillRect/>
-          </a:stretch>
-        </p:blipFill>
-        <p:spPr>
-          <a:xfrm>
-            <a:off x="3047755" y="1499669"/>
-            <a:ext cx="2570780" cy="2146248"/>
-          </a:xfrm>
-          <a:prstGeom prst="rect">
-            <a:avLst/>
-          </a:prstGeom>
-        </p:spPr>
-      </p:pic>
-      <p:pic>
-        <p:nvPicPr>
-          <p:cNvPr id="39" name="Picture 38">
-            <a:extLst>
-              <a:ext uri="{FF2B5EF4-FFF2-40B4-BE49-F238E27FC236}">
-                <a16:creationId xmlns:a16="http://schemas.microsoft.com/office/drawing/2014/main" id="{354FF7AF-31A1-C840-FC69-07610A166767}"/>
-              </a:ext>
-            </a:extLst>
-          </p:cNvPr>
-          <p:cNvPicPr>
-            <a:picLocks noChangeAspect="1"/>
-          </p:cNvPicPr>
-          <p:nvPr/>
-        </p:nvPicPr>
-        <p:blipFill>
-          <a:blip r:embed="rId8"/>
-          <a:stretch>
-            <a:fillRect/>
-          </a:stretch>
-        </p:blipFill>
-        <p:spPr>
-          <a:xfrm>
-            <a:off x="5945987" y="1499669"/>
-            <a:ext cx="2679354" cy="2236892"/>
-          </a:xfrm>
-          <a:prstGeom prst="rect">
-            <a:avLst/>
-          </a:prstGeom>
-        </p:spPr>
-      </p:pic>
-      <p:pic>
-        <p:nvPicPr>
-          <p:cNvPr id="41" name="Picture 40">
-            <a:extLst>
-              <a:ext uri="{FF2B5EF4-FFF2-40B4-BE49-F238E27FC236}">
-                <a16:creationId xmlns:a16="http://schemas.microsoft.com/office/drawing/2014/main" id="{105E53FF-44C7-96A4-7720-86AD677915DE}"/>
-              </a:ext>
-            </a:extLst>
-          </p:cNvPr>
-          <p:cNvPicPr>
-            <a:picLocks noChangeAspect="1"/>
-          </p:cNvPicPr>
-          <p:nvPr/>
-        </p:nvPicPr>
-        <p:blipFill>
-          <a:blip r:embed="rId9"/>
-          <a:stretch>
-            <a:fillRect/>
-          </a:stretch>
-        </p:blipFill>
-        <p:spPr>
-          <a:xfrm>
-            <a:off x="8896361" y="1442602"/>
-            <a:ext cx="2627212" cy="2193362"/>
+            <a:off x="1612191" y="5441783"/>
+            <a:ext cx="8805058" cy="1613984"/>
           </a:xfrm>
           <a:prstGeom prst="rect">
             <a:avLst/>
@@ -4129,7 +4777,7 @@
     </p:spTree>
     <p:extLst>
       <p:ext uri="{BB962C8B-B14F-4D97-AF65-F5344CB8AC3E}">
-        <p14:creationId xmlns:p14="http://schemas.microsoft.com/office/powerpoint/2010/main" val="2359869660"/>
+        <p14:creationId xmlns:p14="http://schemas.microsoft.com/office/powerpoint/2010/main" val="524710998"/>
       </p:ext>
     </p:extLst>
   </p:cSld>
@@ -4161,7 +4809,7 @@
           <p:cNvPr id="2" name="Title 1">
             <a:extLst>
               <a:ext uri="{FF2B5EF4-FFF2-40B4-BE49-F238E27FC236}">
-                <a16:creationId xmlns:a16="http://schemas.microsoft.com/office/drawing/2014/main" id="{EBE6161A-9094-26BB-F266-A48556AE5609}"/>
+                <a16:creationId xmlns:a16="http://schemas.microsoft.com/office/drawing/2014/main" id="{7A4511FE-55EB-7D42-60EE-3058B3C98E98}"/>
               </a:ext>
             </a:extLst>
           </p:cNvPr>
@@ -4172,28 +4820,28 @@
             <p:ph type="title"/>
           </p:nvPr>
         </p:nvSpPr>
-        <p:spPr>
-          <a:xfrm>
-            <a:off x="838200" y="365125"/>
-            <a:ext cx="10515600" cy="823595"/>
-          </a:xfrm>
-        </p:spPr>
+        <p:spPr/>
         <p:txBody>
           <a:bodyPr/>
           <a:lstStyle/>
           <a:p>
             <a:r>
               <a:rPr lang="en-US" dirty="0"/>
-              <a:t>GLM </a:t>
+              <a:t>Mean </a:t>
+            </a:r>
+            <a:r>
+              <a:rPr lang="en-US" dirty="0" err="1"/>
+              <a:t>HbO</a:t>
+            </a:r>
+            <a:r>
+              <a:rPr lang="en-US" dirty="0"/>
+              <a:t> </a:t>
             </a:r>
             <a:r>
               <a:rPr lang="en-US" dirty="0" err="1"/>
               <a:t>topoplots</a:t>
             </a:r>
-            <a:r>
-              <a:rPr lang="en-US" dirty="0"/>
-              <a:t> (BH Corrected a la Eli)</a:t>
-            </a:r>
+            <a:endParaRPr lang="en-US" dirty="0"/>
           </a:p>
         </p:txBody>
       </p:sp>
@@ -4202,7 +4850,7 @@
           <p:cNvPr id="4" name="TextBox 3">
             <a:extLst>
               <a:ext uri="{FF2B5EF4-FFF2-40B4-BE49-F238E27FC236}">
-                <a16:creationId xmlns:a16="http://schemas.microsoft.com/office/drawing/2014/main" id="{EF2246E9-812C-67E4-EDE1-3294B11ADFED}"/>
+                <a16:creationId xmlns:a16="http://schemas.microsoft.com/office/drawing/2014/main" id="{0899B2FC-9A30-F024-10B5-83B46544FDCD}"/>
               </a:ext>
             </a:extLst>
           </p:cNvPr>
@@ -4211,7 +4859,7 @@
         </p:nvSpPr>
         <p:spPr>
           <a:xfrm>
-            <a:off x="364028" y="1004054"/>
+            <a:off x="343708" y="1240711"/>
             <a:ext cx="1837421" cy="369332"/>
           </a:xfrm>
           <a:prstGeom prst="rect">
@@ -4232,132 +4880,12 @@
           </a:p>
         </p:txBody>
       </p:sp>
-      <p:pic>
-        <p:nvPicPr>
-          <p:cNvPr id="16" name="Picture 15">
-            <a:extLst>
-              <a:ext uri="{FF2B5EF4-FFF2-40B4-BE49-F238E27FC236}">
-                <a16:creationId xmlns:a16="http://schemas.microsoft.com/office/drawing/2014/main" id="{F332F77E-7440-B40C-A2C3-F155A6D74460}"/>
-              </a:ext>
-            </a:extLst>
-          </p:cNvPr>
-          <p:cNvPicPr>
-            <a:picLocks noChangeAspect="1"/>
-          </p:cNvPicPr>
-          <p:nvPr/>
-        </p:nvPicPr>
-        <p:blipFill>
-          <a:blip r:embed="rId2"/>
-          <a:stretch>
-            <a:fillRect/>
-          </a:stretch>
-        </p:blipFill>
-        <p:spPr>
-          <a:xfrm>
-            <a:off x="158317" y="4368800"/>
-            <a:ext cx="3032246" cy="2367280"/>
-          </a:xfrm>
-          <a:prstGeom prst="rect">
-            <a:avLst/>
-          </a:prstGeom>
-        </p:spPr>
-      </p:pic>
-      <p:pic>
-        <p:nvPicPr>
-          <p:cNvPr id="18" name="Picture 17">
-            <a:extLst>
-              <a:ext uri="{FF2B5EF4-FFF2-40B4-BE49-F238E27FC236}">
-                <a16:creationId xmlns:a16="http://schemas.microsoft.com/office/drawing/2014/main" id="{D2C54787-D6C5-01A0-802E-040B7167778D}"/>
-              </a:ext>
-            </a:extLst>
-          </p:cNvPr>
-          <p:cNvPicPr>
-            <a:picLocks noChangeAspect="1"/>
-          </p:cNvPicPr>
-          <p:nvPr/>
-        </p:nvPicPr>
-        <p:blipFill>
-          <a:blip r:embed="rId3"/>
-          <a:stretch>
-            <a:fillRect/>
-          </a:stretch>
-        </p:blipFill>
-        <p:spPr>
-          <a:xfrm>
-            <a:off x="3388457" y="4409764"/>
-            <a:ext cx="2961544" cy="2285352"/>
-          </a:xfrm>
-          <a:prstGeom prst="rect">
-            <a:avLst/>
-          </a:prstGeom>
-        </p:spPr>
-      </p:pic>
-      <p:pic>
-        <p:nvPicPr>
-          <p:cNvPr id="20" name="Picture 19">
-            <a:extLst>
-              <a:ext uri="{FF2B5EF4-FFF2-40B4-BE49-F238E27FC236}">
-                <a16:creationId xmlns:a16="http://schemas.microsoft.com/office/drawing/2014/main" id="{CFE8CD7E-392F-2BDF-7275-7BC451C2271A}"/>
-              </a:ext>
-            </a:extLst>
-          </p:cNvPr>
-          <p:cNvPicPr>
-            <a:picLocks noChangeAspect="1"/>
-          </p:cNvPicPr>
-          <p:nvPr/>
-        </p:nvPicPr>
-        <p:blipFill>
-          <a:blip r:embed="rId4"/>
-          <a:stretch>
-            <a:fillRect/>
-          </a:stretch>
-        </p:blipFill>
-        <p:spPr>
-          <a:xfrm>
-            <a:off x="6363083" y="4384674"/>
-            <a:ext cx="2969940" cy="2298476"/>
-          </a:xfrm>
-          <a:prstGeom prst="rect">
-            <a:avLst/>
-          </a:prstGeom>
-        </p:spPr>
-      </p:pic>
-      <p:pic>
-        <p:nvPicPr>
-          <p:cNvPr id="22" name="Picture 21">
-            <a:extLst>
-              <a:ext uri="{FF2B5EF4-FFF2-40B4-BE49-F238E27FC236}">
-                <a16:creationId xmlns:a16="http://schemas.microsoft.com/office/drawing/2014/main" id="{26EB9422-572A-FC38-E0E3-3B80055E81B9}"/>
-              </a:ext>
-            </a:extLst>
-          </p:cNvPr>
-          <p:cNvPicPr>
-            <a:picLocks noChangeAspect="1"/>
-          </p:cNvPicPr>
-          <p:nvPr/>
-        </p:nvPicPr>
-        <p:blipFill>
-          <a:blip r:embed="rId5"/>
-          <a:stretch>
-            <a:fillRect/>
-          </a:stretch>
-        </p:blipFill>
-        <p:spPr>
-          <a:xfrm>
-            <a:off x="9346106" y="4489994"/>
-            <a:ext cx="2713814" cy="2124892"/>
-          </a:xfrm>
-          <a:prstGeom prst="rect">
-            <a:avLst/>
-          </a:prstGeom>
-        </p:spPr>
-      </p:pic>
-      <p:sp>
-        <p:nvSpPr>
-          <p:cNvPr id="23" name="TextBox 22">
-            <a:extLst>
-              <a:ext uri="{FF2B5EF4-FFF2-40B4-BE49-F238E27FC236}">
-                <a16:creationId xmlns:a16="http://schemas.microsoft.com/office/drawing/2014/main" id="{F1CCC18E-2398-5D97-6937-4FF3D5C826B2}"/>
+      <p:sp>
+        <p:nvSpPr>
+          <p:cNvPr id="5" name="TextBox 4">
+            <a:extLst>
+              <a:ext uri="{FF2B5EF4-FFF2-40B4-BE49-F238E27FC236}">
+                <a16:creationId xmlns:a16="http://schemas.microsoft.com/office/drawing/2014/main" id="{E9A4A655-5A5C-E08B-476A-7775D8F1CA63}"/>
               </a:ext>
             </a:extLst>
           </p:cNvPr>
@@ -4366,7 +4894,7 @@
         </p:nvSpPr>
         <p:spPr>
           <a:xfrm>
-            <a:off x="364027" y="3814802"/>
+            <a:off x="343708" y="4195100"/>
             <a:ext cx="1837421" cy="369332"/>
           </a:xfrm>
           <a:prstGeom prst="rect">
@@ -4387,100 +4915,10 @@
           </a:p>
         </p:txBody>
       </p:sp>
-      <p:pic>
-        <p:nvPicPr>
-          <p:cNvPr id="25" name="Picture 24">
-            <a:extLst>
-              <a:ext uri="{FF2B5EF4-FFF2-40B4-BE49-F238E27FC236}">
-                <a16:creationId xmlns:a16="http://schemas.microsoft.com/office/drawing/2014/main" id="{E3B432D0-0C6B-B343-6B31-7C972210F553}"/>
-              </a:ext>
-            </a:extLst>
-          </p:cNvPr>
-          <p:cNvPicPr>
-            <a:picLocks noChangeAspect="1"/>
-          </p:cNvPicPr>
-          <p:nvPr/>
-        </p:nvPicPr>
-        <p:blipFill>
-          <a:blip r:embed="rId6"/>
-          <a:stretch>
-            <a:fillRect/>
-          </a:stretch>
-        </p:blipFill>
-        <p:spPr>
-          <a:xfrm>
-            <a:off x="158317" y="1478584"/>
-            <a:ext cx="2857712" cy="2231020"/>
-          </a:xfrm>
-          <a:prstGeom prst="rect">
-            <a:avLst/>
-          </a:prstGeom>
-        </p:spPr>
-      </p:pic>
-      <p:pic>
-        <p:nvPicPr>
-          <p:cNvPr id="27" name="Picture 26">
-            <a:extLst>
-              <a:ext uri="{FF2B5EF4-FFF2-40B4-BE49-F238E27FC236}">
-                <a16:creationId xmlns:a16="http://schemas.microsoft.com/office/drawing/2014/main" id="{ECA9F22E-18B1-CDE2-C73F-ED268BA12217}"/>
-              </a:ext>
-            </a:extLst>
-          </p:cNvPr>
-          <p:cNvPicPr>
-            <a:picLocks noChangeAspect="1"/>
-          </p:cNvPicPr>
-          <p:nvPr/>
-        </p:nvPicPr>
-        <p:blipFill>
-          <a:blip r:embed="rId7"/>
-          <a:stretch>
-            <a:fillRect/>
-          </a:stretch>
-        </p:blipFill>
-        <p:spPr>
-          <a:xfrm>
-            <a:off x="3016029" y="1478584"/>
-            <a:ext cx="2844802" cy="2195266"/>
-          </a:xfrm>
-          <a:prstGeom prst="rect">
-            <a:avLst/>
-          </a:prstGeom>
-        </p:spPr>
-      </p:pic>
-      <p:pic>
-        <p:nvPicPr>
-          <p:cNvPr id="29" name="Picture 28">
-            <a:extLst>
-              <a:ext uri="{FF2B5EF4-FFF2-40B4-BE49-F238E27FC236}">
-                <a16:creationId xmlns:a16="http://schemas.microsoft.com/office/drawing/2014/main" id="{579E7447-7235-F1C8-79C9-21E853BAC6EB}"/>
-              </a:ext>
-            </a:extLst>
-          </p:cNvPr>
-          <p:cNvPicPr>
-            <a:picLocks noChangeAspect="1"/>
-          </p:cNvPicPr>
-          <p:nvPr/>
-        </p:nvPicPr>
-        <p:blipFill>
-          <a:blip r:embed="rId8"/>
-          <a:stretch>
-            <a:fillRect/>
-          </a:stretch>
-        </p:blipFill>
-        <p:spPr>
-          <a:xfrm>
-            <a:off x="5950223" y="1478584"/>
-            <a:ext cx="3008788" cy="2328540"/>
-          </a:xfrm>
-          <a:prstGeom prst="rect">
-            <a:avLst/>
-          </a:prstGeom>
-        </p:spPr>
-      </p:pic>
     </p:spTree>
     <p:extLst>
       <p:ext uri="{BB962C8B-B14F-4D97-AF65-F5344CB8AC3E}">
-        <p14:creationId xmlns:p14="http://schemas.microsoft.com/office/powerpoint/2010/main" val="2454698054"/>
+        <p14:creationId xmlns:p14="http://schemas.microsoft.com/office/powerpoint/2010/main" val="469896196"/>
       </p:ext>
     </p:extLst>
   </p:cSld>
@@ -4512,7 +4950,7 @@
           <p:cNvPr id="2" name="Title 1">
             <a:extLst>
               <a:ext uri="{FF2B5EF4-FFF2-40B4-BE49-F238E27FC236}">
-                <a16:creationId xmlns:a16="http://schemas.microsoft.com/office/drawing/2014/main" id="{01AAF186-A7CB-8F9D-6786-97CA2C012479}"/>
+                <a16:creationId xmlns:a16="http://schemas.microsoft.com/office/drawing/2014/main" id="{29AF55CE-0436-2773-4527-649CC18DD771}"/>
               </a:ext>
             </a:extLst>
           </p:cNvPr>
@@ -4530,7 +4968,15 @@
           <a:p>
             <a:r>
               <a:rPr lang="en-US" dirty="0"/>
-              <a:t>GLM Channel by Channel, across subjects</a:t>
+              <a:t>Block average </a:t>
+            </a:r>
+            <a:r>
+              <a:rPr lang="en-US" dirty="0" err="1"/>
+              <a:t>topoplots</a:t>
+            </a:r>
+            <a:r>
+              <a:rPr lang="en-US" dirty="0"/>
+              <a:t> (BH corrected)</a:t>
             </a:r>
           </a:p>
         </p:txBody>
@@ -4540,7 +4986,7 @@
           <p:cNvPr id="3" name="Content Placeholder 2">
             <a:extLst>
               <a:ext uri="{FF2B5EF4-FFF2-40B4-BE49-F238E27FC236}">
-                <a16:creationId xmlns:a16="http://schemas.microsoft.com/office/drawing/2014/main" id="{8661222C-D35E-816E-65F5-A8F84ECAE8B8}"/>
+                <a16:creationId xmlns:a16="http://schemas.microsoft.com/office/drawing/2014/main" id="{4045D7C7-8831-D53B-3B56-0486A15439FB}"/>
               </a:ext>
             </a:extLst>
           </p:cNvPr>
@@ -4563,7 +5009,7 @@
     </p:spTree>
     <p:extLst>
       <p:ext uri="{BB962C8B-B14F-4D97-AF65-F5344CB8AC3E}">
-        <p14:creationId xmlns:p14="http://schemas.microsoft.com/office/powerpoint/2010/main" val="15692493"/>
+        <p14:creationId xmlns:p14="http://schemas.microsoft.com/office/powerpoint/2010/main" val="1713963719"/>
       </p:ext>
     </p:extLst>
   </p:cSld>
@@ -4595,7 +5041,7 @@
           <p:cNvPr id="2" name="Title 1">
             <a:extLst>
               <a:ext uri="{FF2B5EF4-FFF2-40B4-BE49-F238E27FC236}">
-                <a16:creationId xmlns:a16="http://schemas.microsoft.com/office/drawing/2014/main" id="{80343B3E-3B81-7802-6F55-676A963D053B}"/>
+                <a16:creationId xmlns:a16="http://schemas.microsoft.com/office/drawing/2014/main" id="{7D982123-15B2-1432-2665-37AFC5D3121A}"/>
               </a:ext>
             </a:extLst>
           </p:cNvPr>
@@ -4606,47 +5052,342 @@
             <p:ph type="title"/>
           </p:nvPr>
         </p:nvSpPr>
-        <p:spPr/>
+        <p:spPr>
+          <a:xfrm>
+            <a:off x="838200" y="0"/>
+            <a:ext cx="10515600" cy="1325563"/>
+          </a:xfrm>
+        </p:spPr>
         <p:txBody>
           <a:bodyPr/>
           <a:lstStyle/>
           <a:p>
             <a:r>
               <a:rPr lang="en-US" dirty="0"/>
-              <a:t>Mixed Effects Model Analysis</a:t>
-            </a:r>
-          </a:p>
-        </p:txBody>
-      </p:sp>
-      <p:sp>
-        <p:nvSpPr>
-          <p:cNvPr id="3" name="Content Placeholder 2">
-            <a:extLst>
-              <a:ext uri="{FF2B5EF4-FFF2-40B4-BE49-F238E27FC236}">
-                <a16:creationId xmlns:a16="http://schemas.microsoft.com/office/drawing/2014/main" id="{B77BFE24-49DE-2AB6-FDE5-A2AA3BF4B15D}"/>
-              </a:ext>
-            </a:extLst>
-          </p:cNvPr>
-          <p:cNvSpPr>
-            <a:spLocks noGrp="1"/>
-          </p:cNvSpPr>
-          <p:nvPr>
-            <p:ph idx="1"/>
-          </p:nvPr>
-        </p:nvSpPr>
-        <p:spPr/>
-        <p:txBody>
-          <a:bodyPr/>
-          <a:lstStyle/>
-          <a:p>
-            <a:endParaRPr lang="en-US"/>
-          </a:p>
-        </p:txBody>
-      </p:sp>
+              <a:t>GLM </a:t>
+            </a:r>
+            <a:r>
+              <a:rPr lang="en-US" dirty="0" err="1"/>
+              <a:t>topoplots</a:t>
+            </a:r>
+            <a:endParaRPr lang="en-US" dirty="0"/>
+          </a:p>
+        </p:txBody>
+      </p:sp>
+      <p:sp>
+        <p:nvSpPr>
+          <p:cNvPr id="10" name="TextBox 9">
+            <a:extLst>
+              <a:ext uri="{FF2B5EF4-FFF2-40B4-BE49-F238E27FC236}">
+                <a16:creationId xmlns:a16="http://schemas.microsoft.com/office/drawing/2014/main" id="{333A7074-FAA7-39C8-2789-A75504149594}"/>
+              </a:ext>
+            </a:extLst>
+          </p:cNvPr>
+          <p:cNvSpPr txBox="1"/>
+          <p:nvPr/>
+        </p:nvSpPr>
+        <p:spPr>
+          <a:xfrm>
+            <a:off x="364028" y="956231"/>
+            <a:ext cx="1837421" cy="369332"/>
+          </a:xfrm>
+          <a:prstGeom prst="rect">
+            <a:avLst/>
+          </a:prstGeom>
+          <a:noFill/>
+        </p:spPr>
+        <p:txBody>
+          <a:bodyPr wrap="square" rtlCol="0">
+            <a:spAutoFit/>
+          </a:bodyPr>
+          <a:lstStyle/>
+          <a:p>
+            <a:r>
+              <a:rPr lang="en-US" dirty="0"/>
+              <a:t>Speech masker</a:t>
+            </a:r>
+          </a:p>
+        </p:txBody>
+      </p:sp>
+      <p:sp>
+        <p:nvSpPr>
+          <p:cNvPr id="21" name="TextBox 20">
+            <a:extLst>
+              <a:ext uri="{FF2B5EF4-FFF2-40B4-BE49-F238E27FC236}">
+                <a16:creationId xmlns:a16="http://schemas.microsoft.com/office/drawing/2014/main" id="{4DAA716A-D4C9-DF2C-19F5-01F3E91CE933}"/>
+              </a:ext>
+            </a:extLst>
+          </p:cNvPr>
+          <p:cNvSpPr txBox="1"/>
+          <p:nvPr/>
+        </p:nvSpPr>
+        <p:spPr>
+          <a:xfrm>
+            <a:off x="364028" y="3910620"/>
+            <a:ext cx="1837421" cy="369332"/>
+          </a:xfrm>
+          <a:prstGeom prst="rect">
+            <a:avLst/>
+          </a:prstGeom>
+          <a:noFill/>
+        </p:spPr>
+        <p:txBody>
+          <a:bodyPr wrap="square" rtlCol="0">
+            <a:spAutoFit/>
+          </a:bodyPr>
+          <a:lstStyle/>
+          <a:p>
+            <a:r>
+              <a:rPr lang="en-US" dirty="0"/>
+              <a:t>Noise masker</a:t>
+            </a:r>
+          </a:p>
+        </p:txBody>
+      </p:sp>
+      <p:pic>
+        <p:nvPicPr>
+          <p:cNvPr id="27" name="Picture 26">
+            <a:extLst>
+              <a:ext uri="{FF2B5EF4-FFF2-40B4-BE49-F238E27FC236}">
+                <a16:creationId xmlns:a16="http://schemas.microsoft.com/office/drawing/2014/main" id="{F01F33EF-9D02-703E-72EA-9D000BBAC166}"/>
+              </a:ext>
+            </a:extLst>
+          </p:cNvPr>
+          <p:cNvPicPr>
+            <a:picLocks noChangeAspect="1"/>
+          </p:cNvPicPr>
+          <p:nvPr/>
+        </p:nvPicPr>
+        <p:blipFill>
+          <a:blip r:embed="rId2"/>
+          <a:stretch>
+            <a:fillRect/>
+          </a:stretch>
+        </p:blipFill>
+        <p:spPr>
+          <a:xfrm>
+            <a:off x="364028" y="4279952"/>
+            <a:ext cx="2820844" cy="2355016"/>
+          </a:xfrm>
+          <a:prstGeom prst="rect">
+            <a:avLst/>
+          </a:prstGeom>
+        </p:spPr>
+      </p:pic>
+      <p:pic>
+        <p:nvPicPr>
+          <p:cNvPr id="29" name="Picture 28">
+            <a:extLst>
+              <a:ext uri="{FF2B5EF4-FFF2-40B4-BE49-F238E27FC236}">
+                <a16:creationId xmlns:a16="http://schemas.microsoft.com/office/drawing/2014/main" id="{9CC59EEB-4CA3-6FC9-2A8C-3835D3979562}"/>
+              </a:ext>
+            </a:extLst>
+          </p:cNvPr>
+          <p:cNvPicPr>
+            <a:picLocks noChangeAspect="1"/>
+          </p:cNvPicPr>
+          <p:nvPr/>
+        </p:nvPicPr>
+        <p:blipFill>
+          <a:blip r:embed="rId3"/>
+          <a:stretch>
+            <a:fillRect/>
+          </a:stretch>
+        </p:blipFill>
+        <p:spPr>
+          <a:xfrm>
+            <a:off x="3184872" y="4279952"/>
+            <a:ext cx="2945414" cy="2459016"/>
+          </a:xfrm>
+          <a:prstGeom prst="rect">
+            <a:avLst/>
+          </a:prstGeom>
+        </p:spPr>
+      </p:pic>
+      <p:pic>
+        <p:nvPicPr>
+          <p:cNvPr id="31" name="Picture 30">
+            <a:extLst>
+              <a:ext uri="{FF2B5EF4-FFF2-40B4-BE49-F238E27FC236}">
+                <a16:creationId xmlns:a16="http://schemas.microsoft.com/office/drawing/2014/main" id="{1225F699-3A16-CE02-C9DD-DCD98B6CE9CD}"/>
+              </a:ext>
+            </a:extLst>
+          </p:cNvPr>
+          <p:cNvPicPr>
+            <a:picLocks noChangeAspect="1"/>
+          </p:cNvPicPr>
+          <p:nvPr/>
+        </p:nvPicPr>
+        <p:blipFill>
+          <a:blip r:embed="rId4"/>
+          <a:stretch>
+            <a:fillRect/>
+          </a:stretch>
+        </p:blipFill>
+        <p:spPr>
+          <a:xfrm>
+            <a:off x="6130286" y="4382562"/>
+            <a:ext cx="2822508" cy="2356406"/>
+          </a:xfrm>
+          <a:prstGeom prst="rect">
+            <a:avLst/>
+          </a:prstGeom>
+        </p:spPr>
+      </p:pic>
+      <p:pic>
+        <p:nvPicPr>
+          <p:cNvPr id="33" name="Picture 32">
+            <a:extLst>
+              <a:ext uri="{FF2B5EF4-FFF2-40B4-BE49-F238E27FC236}">
+                <a16:creationId xmlns:a16="http://schemas.microsoft.com/office/drawing/2014/main" id="{10E26111-D51A-9A87-79F3-CB08DD72147E}"/>
+              </a:ext>
+            </a:extLst>
+          </p:cNvPr>
+          <p:cNvPicPr>
+            <a:picLocks noChangeAspect="1"/>
+          </p:cNvPicPr>
+          <p:nvPr/>
+        </p:nvPicPr>
+        <p:blipFill>
+          <a:blip r:embed="rId5"/>
+          <a:stretch>
+            <a:fillRect/>
+          </a:stretch>
+        </p:blipFill>
+        <p:spPr>
+          <a:xfrm>
+            <a:off x="9097710" y="4382562"/>
+            <a:ext cx="2912138" cy="2431236"/>
+          </a:xfrm>
+          <a:prstGeom prst="rect">
+            <a:avLst/>
+          </a:prstGeom>
+        </p:spPr>
+      </p:pic>
+      <p:pic>
+        <p:nvPicPr>
+          <p:cNvPr id="35" name="Picture 34">
+            <a:extLst>
+              <a:ext uri="{FF2B5EF4-FFF2-40B4-BE49-F238E27FC236}">
+                <a16:creationId xmlns:a16="http://schemas.microsoft.com/office/drawing/2014/main" id="{80CAD29F-88AE-4723-EFAC-F8BB17F74CAB}"/>
+              </a:ext>
+            </a:extLst>
+          </p:cNvPr>
+          <p:cNvPicPr>
+            <a:picLocks noChangeAspect="1"/>
+          </p:cNvPicPr>
+          <p:nvPr/>
+        </p:nvPicPr>
+        <p:blipFill>
+          <a:blip r:embed="rId6"/>
+          <a:stretch>
+            <a:fillRect/>
+          </a:stretch>
+        </p:blipFill>
+        <p:spPr>
+          <a:xfrm>
+            <a:off x="285237" y="1419632"/>
+            <a:ext cx="2762518" cy="2306322"/>
+          </a:xfrm>
+          <a:prstGeom prst="rect">
+            <a:avLst/>
+          </a:prstGeom>
+        </p:spPr>
+      </p:pic>
+      <p:pic>
+        <p:nvPicPr>
+          <p:cNvPr id="37" name="Picture 36">
+            <a:extLst>
+              <a:ext uri="{FF2B5EF4-FFF2-40B4-BE49-F238E27FC236}">
+                <a16:creationId xmlns:a16="http://schemas.microsoft.com/office/drawing/2014/main" id="{E7673780-6817-483B-CF1E-9F705A80C046}"/>
+              </a:ext>
+            </a:extLst>
+          </p:cNvPr>
+          <p:cNvPicPr>
+            <a:picLocks noChangeAspect="1"/>
+          </p:cNvPicPr>
+          <p:nvPr/>
+        </p:nvPicPr>
+        <p:blipFill>
+          <a:blip r:embed="rId7"/>
+          <a:stretch>
+            <a:fillRect/>
+          </a:stretch>
+        </p:blipFill>
+        <p:spPr>
+          <a:xfrm>
+            <a:off x="3047755" y="1499669"/>
+            <a:ext cx="2570780" cy="2146248"/>
+          </a:xfrm>
+          <a:prstGeom prst="rect">
+            <a:avLst/>
+          </a:prstGeom>
+        </p:spPr>
+      </p:pic>
+      <p:pic>
+        <p:nvPicPr>
+          <p:cNvPr id="39" name="Picture 38">
+            <a:extLst>
+              <a:ext uri="{FF2B5EF4-FFF2-40B4-BE49-F238E27FC236}">
+                <a16:creationId xmlns:a16="http://schemas.microsoft.com/office/drawing/2014/main" id="{354FF7AF-31A1-C840-FC69-07610A166767}"/>
+              </a:ext>
+            </a:extLst>
+          </p:cNvPr>
+          <p:cNvPicPr>
+            <a:picLocks noChangeAspect="1"/>
+          </p:cNvPicPr>
+          <p:nvPr/>
+        </p:nvPicPr>
+        <p:blipFill>
+          <a:blip r:embed="rId8"/>
+          <a:stretch>
+            <a:fillRect/>
+          </a:stretch>
+        </p:blipFill>
+        <p:spPr>
+          <a:xfrm>
+            <a:off x="5945987" y="1499669"/>
+            <a:ext cx="2679354" cy="2236892"/>
+          </a:xfrm>
+          <a:prstGeom prst="rect">
+            <a:avLst/>
+          </a:prstGeom>
+        </p:spPr>
+      </p:pic>
+      <p:pic>
+        <p:nvPicPr>
+          <p:cNvPr id="41" name="Picture 40">
+            <a:extLst>
+              <a:ext uri="{FF2B5EF4-FFF2-40B4-BE49-F238E27FC236}">
+                <a16:creationId xmlns:a16="http://schemas.microsoft.com/office/drawing/2014/main" id="{105E53FF-44C7-96A4-7720-86AD677915DE}"/>
+              </a:ext>
+            </a:extLst>
+          </p:cNvPr>
+          <p:cNvPicPr>
+            <a:picLocks noChangeAspect="1"/>
+          </p:cNvPicPr>
+          <p:nvPr/>
+        </p:nvPicPr>
+        <p:blipFill>
+          <a:blip r:embed="rId9"/>
+          <a:stretch>
+            <a:fillRect/>
+          </a:stretch>
+        </p:blipFill>
+        <p:spPr>
+          <a:xfrm>
+            <a:off x="8896361" y="1442602"/>
+            <a:ext cx="2627212" cy="2193362"/>
+          </a:xfrm>
+          <a:prstGeom prst="rect">
+            <a:avLst/>
+          </a:prstGeom>
+        </p:spPr>
+      </p:pic>
     </p:spTree>
     <p:extLst>
       <p:ext uri="{BB962C8B-B14F-4D97-AF65-F5344CB8AC3E}">
-        <p14:creationId xmlns:p14="http://schemas.microsoft.com/office/powerpoint/2010/main" val="1614852943"/>
+        <p14:creationId xmlns:p14="http://schemas.microsoft.com/office/powerpoint/2010/main" val="2359869660"/>
       </p:ext>
     </p:extLst>
   </p:cSld>

</xml_diff>